<commit_message>
Updates from WW1826 class
</commit_message>
<xml_diff>
--- a/labmanual/English/002-23599_Source/Manual/WW101-Binder-Cover.pptx
+++ b/labmanual/English/002-23599_Source/Manual/WW101-Binder-Cover.pptx
@@ -113,10 +113,6 @@
 </p:presentation>
 </file>
 
-<file path=ppt/revisionInfo.xml><?xml version="1.0" encoding="utf-8"?>
-<p1510:revInfo xmlns:a="http://schemas.openxmlformats.org/drawingml/2006/main" xmlns:r="http://schemas.openxmlformats.org/officeDocument/2006/relationships" xmlns:p1510="http://schemas.microsoft.com/office/powerpoint/2015/10/main"/>
-</file>
-
 <file path=ppt/slideLayouts/slideLayout1.xml><?xml version="1.0" encoding="utf-8"?>
 <p:sldLayout xmlns:a="http://schemas.openxmlformats.org/drawingml/2006/main" xmlns:r="http://schemas.openxmlformats.org/officeDocument/2006/relationships" xmlns:p="http://schemas.openxmlformats.org/presentationml/2006/main" type="title" preserve="1">
   <p:cSld name="Title Slide">
@@ -248,7 +244,7 @@
           <a:p>
             <a:fld id="{FD9117CB-CD87-A145-B0DD-B1FF23D56DC0}" type="datetimeFigureOut">
               <a:rPr lang="en-US" smtClean="0"/>
-              <a:t>3/13/2018</a:t>
+              <a:t>7/3/2018</a:t>
             </a:fld>
             <a:endParaRPr lang="en-US"/>
           </a:p>
@@ -418,7 +414,7 @@
           <a:p>
             <a:fld id="{FD9117CB-CD87-A145-B0DD-B1FF23D56DC0}" type="datetimeFigureOut">
               <a:rPr lang="en-US" smtClean="0"/>
-              <a:t>3/13/2018</a:t>
+              <a:t>7/3/2018</a:t>
             </a:fld>
             <a:endParaRPr lang="en-US"/>
           </a:p>
@@ -598,7 +594,7 @@
           <a:p>
             <a:fld id="{FD9117CB-CD87-A145-B0DD-B1FF23D56DC0}" type="datetimeFigureOut">
               <a:rPr lang="en-US" smtClean="0"/>
-              <a:t>3/13/2018</a:t>
+              <a:t>7/3/2018</a:t>
             </a:fld>
             <a:endParaRPr lang="en-US"/>
           </a:p>
@@ -768,7 +764,7 @@
           <a:p>
             <a:fld id="{FD9117CB-CD87-A145-B0DD-B1FF23D56DC0}" type="datetimeFigureOut">
               <a:rPr lang="en-US" smtClean="0"/>
-              <a:t>3/13/2018</a:t>
+              <a:t>7/3/2018</a:t>
             </a:fld>
             <a:endParaRPr lang="en-US"/>
           </a:p>
@@ -1012,7 +1008,7 @@
           <a:p>
             <a:fld id="{FD9117CB-CD87-A145-B0DD-B1FF23D56DC0}" type="datetimeFigureOut">
               <a:rPr lang="en-US" smtClean="0"/>
-              <a:t>3/13/2018</a:t>
+              <a:t>7/3/2018</a:t>
             </a:fld>
             <a:endParaRPr lang="en-US"/>
           </a:p>
@@ -1244,7 +1240,7 @@
           <a:p>
             <a:fld id="{FD9117CB-CD87-A145-B0DD-B1FF23D56DC0}" type="datetimeFigureOut">
               <a:rPr lang="en-US" smtClean="0"/>
-              <a:t>3/13/2018</a:t>
+              <a:t>7/3/2018</a:t>
             </a:fld>
             <a:endParaRPr lang="en-US"/>
           </a:p>
@@ -1611,7 +1607,7 @@
           <a:p>
             <a:fld id="{FD9117CB-CD87-A145-B0DD-B1FF23D56DC0}" type="datetimeFigureOut">
               <a:rPr lang="en-US" smtClean="0"/>
-              <a:t>3/13/2018</a:t>
+              <a:t>7/3/2018</a:t>
             </a:fld>
             <a:endParaRPr lang="en-US"/>
           </a:p>
@@ -1729,7 +1725,7 @@
           <a:p>
             <a:fld id="{FD9117CB-CD87-A145-B0DD-B1FF23D56DC0}" type="datetimeFigureOut">
               <a:rPr lang="en-US" smtClean="0"/>
-              <a:t>3/13/2018</a:t>
+              <a:t>7/3/2018</a:t>
             </a:fld>
             <a:endParaRPr lang="en-US"/>
           </a:p>
@@ -1824,7 +1820,7 @@
           <a:p>
             <a:fld id="{FD9117CB-CD87-A145-B0DD-B1FF23D56DC0}" type="datetimeFigureOut">
               <a:rPr lang="en-US" smtClean="0"/>
-              <a:t>3/13/2018</a:t>
+              <a:t>7/3/2018</a:t>
             </a:fld>
             <a:endParaRPr lang="en-US"/>
           </a:p>
@@ -2101,7 +2097,7 @@
           <a:p>
             <a:fld id="{FD9117CB-CD87-A145-B0DD-B1FF23D56DC0}" type="datetimeFigureOut">
               <a:rPr lang="en-US" smtClean="0"/>
-              <a:t>3/13/2018</a:t>
+              <a:t>7/3/2018</a:t>
             </a:fld>
             <a:endParaRPr lang="en-US"/>
           </a:p>
@@ -2358,7 +2354,7 @@
           <a:p>
             <a:fld id="{FD9117CB-CD87-A145-B0DD-B1FF23D56DC0}" type="datetimeFigureOut">
               <a:rPr lang="en-US" smtClean="0"/>
-              <a:t>3/13/2018</a:t>
+              <a:t>7/3/2018</a:t>
             </a:fld>
             <a:endParaRPr lang="en-US"/>
           </a:p>
@@ -2571,7 +2567,7 @@
           <a:p>
             <a:fld id="{FD9117CB-CD87-A145-B0DD-B1FF23D56DC0}" type="datetimeFigureOut">
               <a:rPr lang="en-US" smtClean="0"/>
-              <a:t>3/13/2018</a:t>
+              <a:t>7/3/2018</a:t>
             </a:fld>
             <a:endParaRPr lang="en-US"/>
           </a:p>
@@ -3109,8 +3105,8 @@
         </p:nvSpPr>
         <p:spPr>
           <a:xfrm>
-            <a:off x="6036493" y="8812800"/>
-            <a:ext cx="801823" cy="253916"/>
+            <a:off x="5903893" y="8813196"/>
+            <a:ext cx="954107" cy="253916"/>
           </a:xfrm>
           <a:prstGeom prst="rect">
             <a:avLst/>
@@ -3124,9 +3120,10 @@
           <a:lstStyle/>
           <a:p>
             <a:r>
-              <a:rPr lang="en-US" sz="1050" dirty="0"/>
-              <a:t>Version 2.2</a:t>
-            </a:r>
+              <a:rPr lang="en-US" sz="1050"/>
+              <a:t>002-23599 *A</a:t>
+            </a:r>
+            <a:endParaRPr lang="en-US" sz="1050" dirty="0"/>
           </a:p>
         </p:txBody>
       </p:sp>

</xml_diff>

<commit_message>
Uploaded Binder Cover source
</commit_message>
<xml_diff>
--- a/labmanual/English/002-23599_Source/Manual/WW101-Binder-Cover.pptx
+++ b/labmanual/English/002-23599_Source/Manual/WW101-Binder-Cover.pptx
@@ -244,7 +244,7 @@
           <a:p>
             <a:fld id="{FD9117CB-CD87-A145-B0DD-B1FF23D56DC0}" type="datetimeFigureOut">
               <a:rPr lang="en-US" smtClean="0"/>
-              <a:t>7/3/2018</a:t>
+              <a:t>8/7/2018</a:t>
             </a:fld>
             <a:endParaRPr lang="en-US"/>
           </a:p>
@@ -414,7 +414,7 @@
           <a:p>
             <a:fld id="{FD9117CB-CD87-A145-B0DD-B1FF23D56DC0}" type="datetimeFigureOut">
               <a:rPr lang="en-US" smtClean="0"/>
-              <a:t>7/3/2018</a:t>
+              <a:t>8/7/2018</a:t>
             </a:fld>
             <a:endParaRPr lang="en-US"/>
           </a:p>
@@ -594,7 +594,7 @@
           <a:p>
             <a:fld id="{FD9117CB-CD87-A145-B0DD-B1FF23D56DC0}" type="datetimeFigureOut">
               <a:rPr lang="en-US" smtClean="0"/>
-              <a:t>7/3/2018</a:t>
+              <a:t>8/7/2018</a:t>
             </a:fld>
             <a:endParaRPr lang="en-US"/>
           </a:p>
@@ -764,7 +764,7 @@
           <a:p>
             <a:fld id="{FD9117CB-CD87-A145-B0DD-B1FF23D56DC0}" type="datetimeFigureOut">
               <a:rPr lang="en-US" smtClean="0"/>
-              <a:t>7/3/2018</a:t>
+              <a:t>8/7/2018</a:t>
             </a:fld>
             <a:endParaRPr lang="en-US"/>
           </a:p>
@@ -1008,7 +1008,7 @@
           <a:p>
             <a:fld id="{FD9117CB-CD87-A145-B0DD-B1FF23D56DC0}" type="datetimeFigureOut">
               <a:rPr lang="en-US" smtClean="0"/>
-              <a:t>7/3/2018</a:t>
+              <a:t>8/7/2018</a:t>
             </a:fld>
             <a:endParaRPr lang="en-US"/>
           </a:p>
@@ -1240,7 +1240,7 @@
           <a:p>
             <a:fld id="{FD9117CB-CD87-A145-B0DD-B1FF23D56DC0}" type="datetimeFigureOut">
               <a:rPr lang="en-US" smtClean="0"/>
-              <a:t>7/3/2018</a:t>
+              <a:t>8/7/2018</a:t>
             </a:fld>
             <a:endParaRPr lang="en-US"/>
           </a:p>
@@ -1607,7 +1607,7 @@
           <a:p>
             <a:fld id="{FD9117CB-CD87-A145-B0DD-B1FF23D56DC0}" type="datetimeFigureOut">
               <a:rPr lang="en-US" smtClean="0"/>
-              <a:t>7/3/2018</a:t>
+              <a:t>8/7/2018</a:t>
             </a:fld>
             <a:endParaRPr lang="en-US"/>
           </a:p>
@@ -1725,7 +1725,7 @@
           <a:p>
             <a:fld id="{FD9117CB-CD87-A145-B0DD-B1FF23D56DC0}" type="datetimeFigureOut">
               <a:rPr lang="en-US" smtClean="0"/>
-              <a:t>7/3/2018</a:t>
+              <a:t>8/7/2018</a:t>
             </a:fld>
             <a:endParaRPr lang="en-US"/>
           </a:p>
@@ -1820,7 +1820,7 @@
           <a:p>
             <a:fld id="{FD9117CB-CD87-A145-B0DD-B1FF23D56DC0}" type="datetimeFigureOut">
               <a:rPr lang="en-US" smtClean="0"/>
-              <a:t>7/3/2018</a:t>
+              <a:t>8/7/2018</a:t>
             </a:fld>
             <a:endParaRPr lang="en-US"/>
           </a:p>
@@ -2097,7 +2097,7 @@
           <a:p>
             <a:fld id="{FD9117CB-CD87-A145-B0DD-B1FF23D56DC0}" type="datetimeFigureOut">
               <a:rPr lang="en-US" smtClean="0"/>
-              <a:t>7/3/2018</a:t>
+              <a:t>8/7/2018</a:t>
             </a:fld>
             <a:endParaRPr lang="en-US"/>
           </a:p>
@@ -2354,7 +2354,7 @@
           <a:p>
             <a:fld id="{FD9117CB-CD87-A145-B0DD-B1FF23D56DC0}" type="datetimeFigureOut">
               <a:rPr lang="en-US" smtClean="0"/>
-              <a:t>7/3/2018</a:t>
+              <a:t>8/7/2018</a:t>
             </a:fld>
             <a:endParaRPr lang="en-US"/>
           </a:p>
@@ -2567,7 +2567,7 @@
           <a:p>
             <a:fld id="{FD9117CB-CD87-A145-B0DD-B1FF23D56DC0}" type="datetimeFigureOut">
               <a:rPr lang="en-US" smtClean="0"/>
-              <a:t>7/3/2018</a:t>
+              <a:t>8/7/2018</a:t>
             </a:fld>
             <a:endParaRPr lang="en-US"/>
           </a:p>
@@ -3105,8 +3105,8 @@
         </p:nvSpPr>
         <p:spPr>
           <a:xfrm>
-            <a:off x="5903893" y="8813196"/>
-            <a:ext cx="954107" cy="253916"/>
+            <a:off x="5790622" y="8794146"/>
+            <a:ext cx="949299" cy="253916"/>
           </a:xfrm>
           <a:prstGeom prst="rect">
             <a:avLst/>
@@ -3120,10 +3120,9 @@
           <a:lstStyle/>
           <a:p>
             <a:r>
-              <a:rPr lang="en-US" sz="1050"/>
-              <a:t>002-23599 *A</a:t>
-            </a:r>
-            <a:endParaRPr lang="en-US" sz="1050" dirty="0"/>
+              <a:rPr lang="en-US" sz="1050" dirty="0"/>
+              <a:t>002-23599 *B</a:t>
+            </a:r>
           </a:p>
         </p:txBody>
       </p:sp>

</xml_diff>

<commit_message>
Fix incorrect PDF file checkin
</commit_message>
<xml_diff>
--- a/labmanual/English/002-23599_Source/Manual/WW101-Binder-Cover.pptx
+++ b/labmanual/English/002-23599_Source/Manual/WW101-Binder-Cover.pptx
@@ -244,7 +244,7 @@
           <a:p>
             <a:fld id="{FD9117CB-CD87-A145-B0DD-B1FF23D56DC0}" type="datetimeFigureOut">
               <a:rPr lang="en-US" smtClean="0"/>
-              <a:t>8/7/2018</a:t>
+              <a:t>9/24/2018</a:t>
             </a:fld>
             <a:endParaRPr lang="en-US"/>
           </a:p>
@@ -414,7 +414,7 @@
           <a:p>
             <a:fld id="{FD9117CB-CD87-A145-B0DD-B1FF23D56DC0}" type="datetimeFigureOut">
               <a:rPr lang="en-US" smtClean="0"/>
-              <a:t>8/7/2018</a:t>
+              <a:t>9/24/2018</a:t>
             </a:fld>
             <a:endParaRPr lang="en-US"/>
           </a:p>
@@ -594,7 +594,7 @@
           <a:p>
             <a:fld id="{FD9117CB-CD87-A145-B0DD-B1FF23D56DC0}" type="datetimeFigureOut">
               <a:rPr lang="en-US" smtClean="0"/>
-              <a:t>8/7/2018</a:t>
+              <a:t>9/24/2018</a:t>
             </a:fld>
             <a:endParaRPr lang="en-US"/>
           </a:p>
@@ -764,7 +764,7 @@
           <a:p>
             <a:fld id="{FD9117CB-CD87-A145-B0DD-B1FF23D56DC0}" type="datetimeFigureOut">
               <a:rPr lang="en-US" smtClean="0"/>
-              <a:t>8/7/2018</a:t>
+              <a:t>9/24/2018</a:t>
             </a:fld>
             <a:endParaRPr lang="en-US"/>
           </a:p>
@@ -1008,7 +1008,7 @@
           <a:p>
             <a:fld id="{FD9117CB-CD87-A145-B0DD-B1FF23D56DC0}" type="datetimeFigureOut">
               <a:rPr lang="en-US" smtClean="0"/>
-              <a:t>8/7/2018</a:t>
+              <a:t>9/24/2018</a:t>
             </a:fld>
             <a:endParaRPr lang="en-US"/>
           </a:p>
@@ -1240,7 +1240,7 @@
           <a:p>
             <a:fld id="{FD9117CB-CD87-A145-B0DD-B1FF23D56DC0}" type="datetimeFigureOut">
               <a:rPr lang="en-US" smtClean="0"/>
-              <a:t>8/7/2018</a:t>
+              <a:t>9/24/2018</a:t>
             </a:fld>
             <a:endParaRPr lang="en-US"/>
           </a:p>
@@ -1607,7 +1607,7 @@
           <a:p>
             <a:fld id="{FD9117CB-CD87-A145-B0DD-B1FF23D56DC0}" type="datetimeFigureOut">
               <a:rPr lang="en-US" smtClean="0"/>
-              <a:t>8/7/2018</a:t>
+              <a:t>9/24/2018</a:t>
             </a:fld>
             <a:endParaRPr lang="en-US"/>
           </a:p>
@@ -1725,7 +1725,7 @@
           <a:p>
             <a:fld id="{FD9117CB-CD87-A145-B0DD-B1FF23D56DC0}" type="datetimeFigureOut">
               <a:rPr lang="en-US" smtClean="0"/>
-              <a:t>8/7/2018</a:t>
+              <a:t>9/24/2018</a:t>
             </a:fld>
             <a:endParaRPr lang="en-US"/>
           </a:p>
@@ -1820,7 +1820,7 @@
           <a:p>
             <a:fld id="{FD9117CB-CD87-A145-B0DD-B1FF23D56DC0}" type="datetimeFigureOut">
               <a:rPr lang="en-US" smtClean="0"/>
-              <a:t>8/7/2018</a:t>
+              <a:t>9/24/2018</a:t>
             </a:fld>
             <a:endParaRPr lang="en-US"/>
           </a:p>
@@ -2097,7 +2097,7 @@
           <a:p>
             <a:fld id="{FD9117CB-CD87-A145-B0DD-B1FF23D56DC0}" type="datetimeFigureOut">
               <a:rPr lang="en-US" smtClean="0"/>
-              <a:t>8/7/2018</a:t>
+              <a:t>9/24/2018</a:t>
             </a:fld>
             <a:endParaRPr lang="en-US"/>
           </a:p>
@@ -2354,7 +2354,7 @@
           <a:p>
             <a:fld id="{FD9117CB-CD87-A145-B0DD-B1FF23D56DC0}" type="datetimeFigureOut">
               <a:rPr lang="en-US" smtClean="0"/>
-              <a:t>8/7/2018</a:t>
+              <a:t>9/24/2018</a:t>
             </a:fld>
             <a:endParaRPr lang="en-US"/>
           </a:p>
@@ -2567,7 +2567,7 @@
           <a:p>
             <a:fld id="{FD9117CB-CD87-A145-B0DD-B1FF23D56DC0}" type="datetimeFigureOut">
               <a:rPr lang="en-US" smtClean="0"/>
-              <a:t>8/7/2018</a:t>
+              <a:t>9/24/2018</a:t>
             </a:fld>
             <a:endParaRPr lang="en-US"/>
           </a:p>
@@ -3120,9 +3120,10 @@
           <a:lstStyle/>
           <a:p>
             <a:r>
-              <a:rPr lang="en-US" sz="1050" dirty="0"/>
-              <a:t>002-23599 *B</a:t>
-            </a:r>
+              <a:rPr lang="en-US" sz="1050"/>
+              <a:t>002-23599 *C</a:t>
+            </a:r>
+            <a:endParaRPr lang="en-US" sz="1050" dirty="0"/>
           </a:p>
         </p:txBody>
       </p:sp>

</xml_diff>

<commit_message>
Update video transcripts. Update chpater 7C to include AWS ATS root CA. Remove give-aways from setup instructions. Include separate document for back cover of manual.
</commit_message>
<xml_diff>
--- a/labmanual/English/002-23599_Source/Manual/WW101-Binder-Cover.pptx
+++ b/labmanual/English/002-23599_Source/Manual/WW101-Binder-Cover.pptx
@@ -6,7 +6,6 @@
   </p:sldMasterIdLst>
   <p:sldIdLst>
     <p:sldId id="256" r:id="rId2"/>
-    <p:sldId id="257" r:id="rId3"/>
   </p:sldIdLst>
   <p:sldSz cx="6858000" cy="9144000" type="letter"/>
   <p:notesSz cx="6858000" cy="9296400"/>
@@ -244,7 +243,7 @@
           <a:p>
             <a:fld id="{FD9117CB-CD87-A145-B0DD-B1FF23D56DC0}" type="datetimeFigureOut">
               <a:rPr lang="en-US" smtClean="0"/>
-              <a:t>9/24/2018</a:t>
+              <a:t>11/27/2018</a:t>
             </a:fld>
             <a:endParaRPr lang="en-US"/>
           </a:p>
@@ -414,7 +413,7 @@
           <a:p>
             <a:fld id="{FD9117CB-CD87-A145-B0DD-B1FF23D56DC0}" type="datetimeFigureOut">
               <a:rPr lang="en-US" smtClean="0"/>
-              <a:t>9/24/2018</a:t>
+              <a:t>11/27/2018</a:t>
             </a:fld>
             <a:endParaRPr lang="en-US"/>
           </a:p>
@@ -594,7 +593,7 @@
           <a:p>
             <a:fld id="{FD9117CB-CD87-A145-B0DD-B1FF23D56DC0}" type="datetimeFigureOut">
               <a:rPr lang="en-US" smtClean="0"/>
-              <a:t>9/24/2018</a:t>
+              <a:t>11/27/2018</a:t>
             </a:fld>
             <a:endParaRPr lang="en-US"/>
           </a:p>
@@ -764,7 +763,7 @@
           <a:p>
             <a:fld id="{FD9117CB-CD87-A145-B0DD-B1FF23D56DC0}" type="datetimeFigureOut">
               <a:rPr lang="en-US" smtClean="0"/>
-              <a:t>9/24/2018</a:t>
+              <a:t>11/27/2018</a:t>
             </a:fld>
             <a:endParaRPr lang="en-US"/>
           </a:p>
@@ -1008,7 +1007,7 @@
           <a:p>
             <a:fld id="{FD9117CB-CD87-A145-B0DD-B1FF23D56DC0}" type="datetimeFigureOut">
               <a:rPr lang="en-US" smtClean="0"/>
-              <a:t>9/24/2018</a:t>
+              <a:t>11/27/2018</a:t>
             </a:fld>
             <a:endParaRPr lang="en-US"/>
           </a:p>
@@ -1240,7 +1239,7 @@
           <a:p>
             <a:fld id="{FD9117CB-CD87-A145-B0DD-B1FF23D56DC0}" type="datetimeFigureOut">
               <a:rPr lang="en-US" smtClean="0"/>
-              <a:t>9/24/2018</a:t>
+              <a:t>11/27/2018</a:t>
             </a:fld>
             <a:endParaRPr lang="en-US"/>
           </a:p>
@@ -1607,7 +1606,7 @@
           <a:p>
             <a:fld id="{FD9117CB-CD87-A145-B0DD-B1FF23D56DC0}" type="datetimeFigureOut">
               <a:rPr lang="en-US" smtClean="0"/>
-              <a:t>9/24/2018</a:t>
+              <a:t>11/27/2018</a:t>
             </a:fld>
             <a:endParaRPr lang="en-US"/>
           </a:p>
@@ -1725,7 +1724,7 @@
           <a:p>
             <a:fld id="{FD9117CB-CD87-A145-B0DD-B1FF23D56DC0}" type="datetimeFigureOut">
               <a:rPr lang="en-US" smtClean="0"/>
-              <a:t>9/24/2018</a:t>
+              <a:t>11/27/2018</a:t>
             </a:fld>
             <a:endParaRPr lang="en-US"/>
           </a:p>
@@ -1820,7 +1819,7 @@
           <a:p>
             <a:fld id="{FD9117CB-CD87-A145-B0DD-B1FF23D56DC0}" type="datetimeFigureOut">
               <a:rPr lang="en-US" smtClean="0"/>
-              <a:t>9/24/2018</a:t>
+              <a:t>11/27/2018</a:t>
             </a:fld>
             <a:endParaRPr lang="en-US"/>
           </a:p>
@@ -2097,7 +2096,7 @@
           <a:p>
             <a:fld id="{FD9117CB-CD87-A145-B0DD-B1FF23D56DC0}" type="datetimeFigureOut">
               <a:rPr lang="en-US" smtClean="0"/>
-              <a:t>9/24/2018</a:t>
+              <a:t>11/27/2018</a:t>
             </a:fld>
             <a:endParaRPr lang="en-US"/>
           </a:p>
@@ -2354,7 +2353,7 @@
           <a:p>
             <a:fld id="{FD9117CB-CD87-A145-B0DD-B1FF23D56DC0}" type="datetimeFigureOut">
               <a:rPr lang="en-US" smtClean="0"/>
-              <a:t>9/24/2018</a:t>
+              <a:t>11/27/2018</a:t>
             </a:fld>
             <a:endParaRPr lang="en-US"/>
           </a:p>
@@ -2567,7 +2566,7 @@
           <a:p>
             <a:fld id="{FD9117CB-CD87-A145-B0DD-B1FF23D56DC0}" type="datetimeFigureOut">
               <a:rPr lang="en-US" smtClean="0"/>
-              <a:t>9/24/2018</a:t>
+              <a:t>11/27/2018</a:t>
             </a:fld>
             <a:endParaRPr lang="en-US"/>
           </a:p>
@@ -3106,7 +3105,7 @@
         <p:spPr>
           <a:xfrm>
             <a:off x="5790622" y="8794146"/>
-            <a:ext cx="949299" cy="253916"/>
+            <a:ext cx="958917" cy="253916"/>
           </a:xfrm>
           <a:prstGeom prst="rect">
             <a:avLst/>
@@ -3120,10 +3119,9 @@
           <a:lstStyle/>
           <a:p>
             <a:r>
-              <a:rPr lang="en-US" sz="1050"/>
-              <a:t>002-23599 *C</a:t>
-            </a:r>
-            <a:endParaRPr lang="en-US" sz="1050" dirty="0"/>
+              <a:rPr lang="en-US" sz="1050" dirty="0"/>
+              <a:t>002-23599 *D</a:t>
+            </a:r>
           </a:p>
         </p:txBody>
       </p:sp>
@@ -3131,307 +3129,6 @@
     <p:extLst>
       <p:ext uri="{BB962C8B-B14F-4D97-AF65-F5344CB8AC3E}">
         <p14:creationId xmlns:p14="http://schemas.microsoft.com/office/powerpoint/2010/main" val="1689896419"/>
-      </p:ext>
-    </p:extLst>
-  </p:cSld>
-  <p:clrMapOvr>
-    <a:masterClrMapping/>
-  </p:clrMapOvr>
-</p:sld>
-</file>
-
-<file path=ppt/slides/slide2.xml><?xml version="1.0" encoding="utf-8"?>
-<p:sld xmlns:a="http://schemas.openxmlformats.org/drawingml/2006/main" xmlns:r="http://schemas.openxmlformats.org/officeDocument/2006/relationships" xmlns:p="http://schemas.openxmlformats.org/presentationml/2006/main">
-  <p:cSld>
-    <p:spTree>
-      <p:nvGrpSpPr>
-        <p:cNvPr id="1" name=""/>
-        <p:cNvGrpSpPr/>
-        <p:nvPr/>
-      </p:nvGrpSpPr>
-      <p:grpSpPr>
-        <a:xfrm>
-          <a:off x="0" y="0"/>
-          <a:ext cx="0" cy="0"/>
-          <a:chOff x="0" y="0"/>
-          <a:chExt cx="0" cy="0"/>
-        </a:xfrm>
-      </p:grpSpPr>
-      <p:sp>
-        <p:nvSpPr>
-          <p:cNvPr id="3" name="TextBox 2"/>
-          <p:cNvSpPr txBox="1"/>
-          <p:nvPr/>
-        </p:nvSpPr>
-        <p:spPr>
-          <a:xfrm>
-            <a:off x="179294" y="5533054"/>
-            <a:ext cx="6490447" cy="2800767"/>
-          </a:xfrm>
-          <a:prstGeom prst="rect">
-            <a:avLst/>
-          </a:prstGeom>
-          <a:noFill/>
-        </p:spPr>
-        <p:txBody>
-          <a:bodyPr wrap="square" rtlCol="0">
-            <a:spAutoFit/>
-          </a:bodyPr>
-          <a:lstStyle/>
-          <a:p>
-            <a:r>
-              <a:rPr lang="en-US" sz="1600" dirty="0"/>
-              <a:t>Trouble Shooting Checklist: </a:t>
-            </a:r>
-          </a:p>
-          <a:p>
-            <a:endParaRPr lang="en-US" sz="1600" dirty="0"/>
-          </a:p>
-          <a:p>
-            <a:r>
-              <a:rPr lang="en-US" sz="1600" dirty="0"/>
-              <a:t>Did you SAVE before you ran Make?</a:t>
-            </a:r>
-          </a:p>
-          <a:p>
-            <a:r>
-              <a:rPr lang="en-US" sz="1600" dirty="0"/>
-              <a:t>Did you call </a:t>
-            </a:r>
-            <a:r>
-              <a:rPr lang="en-US" sz="1600" dirty="0" err="1"/>
-              <a:t>wiced_init</a:t>
-            </a:r>
-            <a:r>
-              <a:rPr lang="en-US" sz="1600" dirty="0"/>
-              <a:t> before any other WICED function?</a:t>
-            </a:r>
-          </a:p>
-          <a:p>
-            <a:r>
-              <a:rPr lang="en-US" sz="1600" dirty="0"/>
-              <a:t>Did you call the </a:t>
-            </a:r>
-            <a:r>
-              <a:rPr lang="en-US" sz="1600" dirty="0" err="1"/>
-              <a:t>init</a:t>
-            </a:r>
-            <a:r>
-              <a:rPr lang="en-US" sz="1600" dirty="0"/>
-              <a:t> function for each peripheral used?</a:t>
-            </a:r>
-          </a:p>
-          <a:p>
-            <a:r>
-              <a:rPr lang="en-US" sz="1600" dirty="0"/>
-              <a:t>Do the project folder, C file, and make file all have the same name?</a:t>
-            </a:r>
-          </a:p>
-          <a:p>
-            <a:r>
-              <a:rPr lang="en-US" sz="1600" dirty="0"/>
-              <a:t>Is the APP NAME in the make file unique?</a:t>
-            </a:r>
-          </a:p>
-          <a:p>
-            <a:r>
-              <a:rPr lang="en-US" sz="1600" dirty="0"/>
-              <a:t>Did you clean after modifying certificates or other non-c/h files?</a:t>
-            </a:r>
-          </a:p>
-          <a:p>
-            <a:r>
-              <a:rPr lang="en-US" sz="1600" dirty="0"/>
-              <a:t>Did you call </a:t>
-            </a:r>
-            <a:r>
-              <a:rPr lang="en-US" sz="1600" dirty="0" err="1"/>
-              <a:t>wiced_network_up</a:t>
-            </a:r>
-            <a:r>
-              <a:rPr lang="en-US" sz="1600" dirty="0"/>
-              <a:t> before any network activities?</a:t>
-            </a:r>
-          </a:p>
-          <a:p>
-            <a:r>
-              <a:rPr lang="en-US" sz="1600" dirty="0"/>
-              <a:t>Did you create all structures before referencing them in function calls?</a:t>
-            </a:r>
-          </a:p>
-          <a:p>
-            <a:r>
-              <a:rPr lang="en-US" sz="1600" dirty="0"/>
-              <a:t>Did you use WPRINT_APP_INFO for debugging (e.g. WICED return codes)?</a:t>
-            </a:r>
-          </a:p>
-        </p:txBody>
-      </p:sp>
-      <p:sp>
-        <p:nvSpPr>
-          <p:cNvPr id="4" name="TextBox 3"/>
-          <p:cNvSpPr txBox="1"/>
-          <p:nvPr/>
-        </p:nvSpPr>
-        <p:spPr>
-          <a:xfrm>
-            <a:off x="984451" y="2981047"/>
-            <a:ext cx="5174943" cy="369332"/>
-          </a:xfrm>
-          <a:prstGeom prst="rect">
-            <a:avLst/>
-          </a:prstGeom>
-          <a:noFill/>
-        </p:spPr>
-        <p:txBody>
-          <a:bodyPr wrap="none" rtlCol="0">
-            <a:spAutoFit/>
-          </a:bodyPr>
-          <a:lstStyle/>
-          <a:p>
-            <a:pPr algn="ctr"/>
-            <a:r>
-              <a:rPr lang="en-US" dirty="0"/>
-              <a:t>wwep.ww101.cypress.com IP Address = 198.51.100.3</a:t>
-            </a:r>
-          </a:p>
-        </p:txBody>
-      </p:sp>
-      <p:sp>
-        <p:nvSpPr>
-          <p:cNvPr id="7" name="TextBox 6"/>
-          <p:cNvSpPr txBox="1"/>
-          <p:nvPr/>
-        </p:nvSpPr>
-        <p:spPr>
-          <a:xfrm>
-            <a:off x="2096794" y="3602175"/>
-            <a:ext cx="2689006" cy="1477328"/>
-          </a:xfrm>
-          <a:prstGeom prst="rect">
-            <a:avLst/>
-          </a:prstGeom>
-          <a:noFill/>
-        </p:spPr>
-        <p:txBody>
-          <a:bodyPr wrap="none" rtlCol="0">
-            <a:spAutoFit/>
-          </a:bodyPr>
-          <a:lstStyle/>
-          <a:p>
-            <a:pPr algn="ctr"/>
-            <a:r>
-              <a:rPr lang="en-US" dirty="0" err="1"/>
-              <a:t>Netblock</a:t>
-            </a:r>
-            <a:r>
-              <a:rPr lang="en-US" dirty="0"/>
-              <a:t>: 198.51.100.0/24</a:t>
-            </a:r>
-          </a:p>
-          <a:p>
-            <a:pPr algn="ctr"/>
-            <a:r>
-              <a:rPr lang="pl-PL" dirty="0"/>
-              <a:t>Gateway:</a:t>
-            </a:r>
-            <a:r>
-              <a:rPr lang="en-US" dirty="0"/>
-              <a:t> </a:t>
-            </a:r>
-            <a:r>
-              <a:rPr lang="pl-PL" dirty="0"/>
-              <a:t>198.51.100.1</a:t>
-            </a:r>
-          </a:p>
-          <a:p>
-            <a:pPr algn="ctr"/>
-            <a:r>
-              <a:rPr lang="tr-TR" dirty="0"/>
-              <a:t>Netmask:</a:t>
-            </a:r>
-            <a:r>
-              <a:rPr lang="en-US" dirty="0"/>
-              <a:t> </a:t>
-            </a:r>
-            <a:r>
-              <a:rPr lang="tr-TR" dirty="0"/>
-              <a:t>255.255.255.0</a:t>
-            </a:r>
-          </a:p>
-          <a:p>
-            <a:pPr algn="ctr"/>
-            <a:r>
-              <a:rPr lang="nb-NO" dirty="0"/>
-              <a:t>DNS1: 8.8.8.8</a:t>
-            </a:r>
-          </a:p>
-          <a:p>
-            <a:pPr algn="ctr"/>
-            <a:r>
-              <a:rPr lang="hr-HR" dirty="0"/>
-              <a:t>DNS2: 8.8.4.4</a:t>
-            </a:r>
-            <a:endParaRPr lang="en-US" dirty="0"/>
-          </a:p>
-        </p:txBody>
-      </p:sp>
-      <p:sp>
-        <p:nvSpPr>
-          <p:cNvPr id="5" name="Rectangle: Rounded Corners 4">
-            <a:extLst>
-              <a:ext uri="{FF2B5EF4-FFF2-40B4-BE49-F238E27FC236}">
-                <a16:creationId xmlns:a16="http://schemas.microsoft.com/office/drawing/2014/main" id="{96EA5AB6-AD4B-44A3-A89E-04C39981A554}"/>
-              </a:ext>
-            </a:extLst>
-          </p:cNvPr>
-          <p:cNvSpPr/>
-          <p:nvPr/>
-        </p:nvSpPr>
-        <p:spPr>
-          <a:xfrm>
-            <a:off x="2240784" y="1467059"/>
-            <a:ext cx="2461844" cy="914399"/>
-          </a:xfrm>
-          <a:prstGeom prst="roundRect">
-            <a:avLst/>
-          </a:prstGeom>
-          <a:noFill/>
-          <a:ln>
-            <a:solidFill>
-              <a:schemeClr val="tx1"/>
-            </a:solidFill>
-          </a:ln>
-        </p:spPr>
-        <p:style>
-          <a:lnRef idx="2">
-            <a:schemeClr val="accent1">
-              <a:shade val="50000"/>
-            </a:schemeClr>
-          </a:lnRef>
-          <a:fillRef idx="1">
-            <a:schemeClr val="accent1"/>
-          </a:fillRef>
-          <a:effectRef idx="0">
-            <a:schemeClr val="accent1"/>
-          </a:effectRef>
-          <a:fontRef idx="minor">
-            <a:schemeClr val="lt1"/>
-          </a:fontRef>
-        </p:style>
-        <p:txBody>
-          <a:bodyPr rtlCol="0" anchor="ctr"/>
-          <a:lstStyle/>
-          <a:p>
-            <a:pPr algn="ctr"/>
-            <a:endParaRPr lang="en-US"/>
-          </a:p>
-        </p:txBody>
-      </p:sp>
-    </p:spTree>
-    <p:extLst>
-      <p:ext uri="{BB962C8B-B14F-4D97-AF65-F5344CB8AC3E}">
-        <p14:creationId xmlns:p14="http://schemas.microsoft.com/office/powerpoint/2010/main" val="421480346"/>
       </p:ext>
     </p:extLst>
   </p:cSld>

</xml_diff>

<commit_message>
Updates after KYCC and MIT classes.
</commit_message>
<xml_diff>
--- a/labmanual/English/002-23599_Source/Manual/WW101-Binder-Cover.pptx
+++ b/labmanual/English/002-23599_Source/Manual/WW101-Binder-Cover.pptx
@@ -243,7 +243,7 @@
           <a:p>
             <a:fld id="{FD9117CB-CD87-A145-B0DD-B1FF23D56DC0}" type="datetimeFigureOut">
               <a:rPr lang="en-US" smtClean="0"/>
-              <a:t>11/27/2018</a:t>
+              <a:t>2/7/2019</a:t>
             </a:fld>
             <a:endParaRPr lang="en-US"/>
           </a:p>
@@ -413,7 +413,7 @@
           <a:p>
             <a:fld id="{FD9117CB-CD87-A145-B0DD-B1FF23D56DC0}" type="datetimeFigureOut">
               <a:rPr lang="en-US" smtClean="0"/>
-              <a:t>11/27/2018</a:t>
+              <a:t>2/7/2019</a:t>
             </a:fld>
             <a:endParaRPr lang="en-US"/>
           </a:p>
@@ -593,7 +593,7 @@
           <a:p>
             <a:fld id="{FD9117CB-CD87-A145-B0DD-B1FF23D56DC0}" type="datetimeFigureOut">
               <a:rPr lang="en-US" smtClean="0"/>
-              <a:t>11/27/2018</a:t>
+              <a:t>2/7/2019</a:t>
             </a:fld>
             <a:endParaRPr lang="en-US"/>
           </a:p>
@@ -763,7 +763,7 @@
           <a:p>
             <a:fld id="{FD9117CB-CD87-A145-B0DD-B1FF23D56DC0}" type="datetimeFigureOut">
               <a:rPr lang="en-US" smtClean="0"/>
-              <a:t>11/27/2018</a:t>
+              <a:t>2/7/2019</a:t>
             </a:fld>
             <a:endParaRPr lang="en-US"/>
           </a:p>
@@ -1007,7 +1007,7 @@
           <a:p>
             <a:fld id="{FD9117CB-CD87-A145-B0DD-B1FF23D56DC0}" type="datetimeFigureOut">
               <a:rPr lang="en-US" smtClean="0"/>
-              <a:t>11/27/2018</a:t>
+              <a:t>2/7/2019</a:t>
             </a:fld>
             <a:endParaRPr lang="en-US"/>
           </a:p>
@@ -1239,7 +1239,7 @@
           <a:p>
             <a:fld id="{FD9117CB-CD87-A145-B0DD-B1FF23D56DC0}" type="datetimeFigureOut">
               <a:rPr lang="en-US" smtClean="0"/>
-              <a:t>11/27/2018</a:t>
+              <a:t>2/7/2019</a:t>
             </a:fld>
             <a:endParaRPr lang="en-US"/>
           </a:p>
@@ -1606,7 +1606,7 @@
           <a:p>
             <a:fld id="{FD9117CB-CD87-A145-B0DD-B1FF23D56DC0}" type="datetimeFigureOut">
               <a:rPr lang="en-US" smtClean="0"/>
-              <a:t>11/27/2018</a:t>
+              <a:t>2/7/2019</a:t>
             </a:fld>
             <a:endParaRPr lang="en-US"/>
           </a:p>
@@ -1724,7 +1724,7 @@
           <a:p>
             <a:fld id="{FD9117CB-CD87-A145-B0DD-B1FF23D56DC0}" type="datetimeFigureOut">
               <a:rPr lang="en-US" smtClean="0"/>
-              <a:t>11/27/2018</a:t>
+              <a:t>2/7/2019</a:t>
             </a:fld>
             <a:endParaRPr lang="en-US"/>
           </a:p>
@@ -1819,7 +1819,7 @@
           <a:p>
             <a:fld id="{FD9117CB-CD87-A145-B0DD-B1FF23D56DC0}" type="datetimeFigureOut">
               <a:rPr lang="en-US" smtClean="0"/>
-              <a:t>11/27/2018</a:t>
+              <a:t>2/7/2019</a:t>
             </a:fld>
             <a:endParaRPr lang="en-US"/>
           </a:p>
@@ -2096,7 +2096,7 @@
           <a:p>
             <a:fld id="{FD9117CB-CD87-A145-B0DD-B1FF23D56DC0}" type="datetimeFigureOut">
               <a:rPr lang="en-US" smtClean="0"/>
-              <a:t>11/27/2018</a:t>
+              <a:t>2/7/2019</a:t>
             </a:fld>
             <a:endParaRPr lang="en-US"/>
           </a:p>
@@ -2353,7 +2353,7 @@
           <a:p>
             <a:fld id="{FD9117CB-CD87-A145-B0DD-B1FF23D56DC0}" type="datetimeFigureOut">
               <a:rPr lang="en-US" smtClean="0"/>
-              <a:t>11/27/2018</a:t>
+              <a:t>2/7/2019</a:t>
             </a:fld>
             <a:endParaRPr lang="en-US"/>
           </a:p>
@@ -2566,7 +2566,7 @@
           <a:p>
             <a:fld id="{FD9117CB-CD87-A145-B0DD-B1FF23D56DC0}" type="datetimeFigureOut">
               <a:rPr lang="en-US" smtClean="0"/>
-              <a:t>11/27/2018</a:t>
+              <a:t>2/7/2019</a:t>
             </a:fld>
             <a:endParaRPr lang="en-US"/>
           </a:p>
@@ -3119,9 +3119,10 @@
           <a:lstStyle/>
           <a:p>
             <a:r>
-              <a:rPr lang="en-US" sz="1050" dirty="0"/>
-              <a:t>002-23599 *D</a:t>
-            </a:r>
+              <a:rPr lang="en-US" sz="1050"/>
+              <a:t>002-23599 *E</a:t>
+            </a:r>
+            <a:endParaRPr lang="en-US" sz="1050" dirty="0"/>
           </a:p>
         </p:txBody>
       </p:sp>

</xml_diff>